<commit_message>
Added code for typescript
</commit_message>
<xml_diff>
--- a/workshop1/Kafka - 101.pptx
+++ b/workshop1/Kafka - 101.pptx
@@ -1913,7 +1913,7 @@
           </a:ln>
           <a:extLst>
             <a:ext uri="{C572A759-6A51-4108-AA02-DFA0A04FC94B}">
-              <ma14:wrappingTextBoxFlag xmlns="" xmlns:ma14="http://schemas.microsoft.com/office/mac/drawingml/2011/main" xmlns:a14="http://schemas.microsoft.com/office/drawing/2010/main" xmlns:m="http://schemas.openxmlformats.org/officeDocument/2006/math" val="1"/>
+              <ma14:wrappingTextBoxFlag xmlns:m="http://schemas.openxmlformats.org/officeDocument/2006/math" xmlns:a14="http://schemas.microsoft.com/office/drawing/2010/main" xmlns:ma14="http://schemas.microsoft.com/office/mac/drawingml/2011/main" xmlns="" val="1"/>
             </a:ext>
           </a:extLst>
         </p:spPr>
@@ -10606,7 +10606,7 @@
           </a:ln>
           <a:extLst>
             <a:ext uri="{C572A759-6A51-4108-AA02-DFA0A04FC94B}">
-              <ma14:wrappingTextBoxFlag xmlns="" xmlns:m="http://schemas.openxmlformats.org/officeDocument/2006/math" xmlns:a14="http://schemas.microsoft.com/office/drawing/2010/main" xmlns:ma14="http://schemas.microsoft.com/office/mac/drawingml/2011/main" val="1"/>
+              <ma14:wrappingTextBoxFlag xmlns:ma14="http://schemas.microsoft.com/office/mac/drawingml/2011/main" xmlns:a14="http://schemas.microsoft.com/office/drawing/2010/main" xmlns:m="http://schemas.openxmlformats.org/officeDocument/2006/math" xmlns="" val="1"/>
             </a:ext>
           </a:extLst>
         </p:spPr>
@@ -10890,7 +10890,7 @@
           </a:ln>
           <a:extLst>
             <a:ext uri="{C572A759-6A51-4108-AA02-DFA0A04FC94B}">
-              <ma14:wrappingTextBoxFlag xmlns="" xmlns:m="http://schemas.openxmlformats.org/officeDocument/2006/math" xmlns:a14="http://schemas.microsoft.com/office/drawing/2010/main" xmlns:ma14="http://schemas.microsoft.com/office/mac/drawingml/2011/main" val="1"/>
+              <ma14:wrappingTextBoxFlag xmlns:ma14="http://schemas.microsoft.com/office/mac/drawingml/2011/main" xmlns:a14="http://schemas.microsoft.com/office/drawing/2010/main" xmlns:m="http://schemas.openxmlformats.org/officeDocument/2006/math" xmlns="" val="1"/>
             </a:ext>
           </a:extLst>
         </p:spPr>
@@ -11174,7 +11174,7 @@
           </a:ln>
           <a:extLst>
             <a:ext uri="{C572A759-6A51-4108-AA02-DFA0A04FC94B}">
-              <ma14:wrappingTextBoxFlag xmlns="" xmlns:m="http://schemas.openxmlformats.org/officeDocument/2006/math" xmlns:a14="http://schemas.microsoft.com/office/drawing/2010/main" xmlns:ma14="http://schemas.microsoft.com/office/mac/drawingml/2011/main" val="1"/>
+              <ma14:wrappingTextBoxFlag xmlns:ma14="http://schemas.microsoft.com/office/mac/drawingml/2011/main" xmlns:a14="http://schemas.microsoft.com/office/drawing/2010/main" xmlns:m="http://schemas.openxmlformats.org/officeDocument/2006/math" xmlns="" val="1"/>
             </a:ext>
           </a:extLst>
         </p:spPr>
@@ -11558,7 +11558,7 @@
           </a:ln>
           <a:extLst>
             <a:ext uri="{C572A759-6A51-4108-AA02-DFA0A04FC94B}">
-              <ma14:wrappingTextBoxFlag xmlns="" xmlns:ma14="http://schemas.microsoft.com/office/mac/drawingml/2011/main" xmlns:a14="http://schemas.microsoft.com/office/drawing/2010/main" xmlns:m="http://schemas.openxmlformats.org/officeDocument/2006/math" val="1"/>
+              <ma14:wrappingTextBoxFlag xmlns:m="http://schemas.openxmlformats.org/officeDocument/2006/math" xmlns:a14="http://schemas.microsoft.com/office/drawing/2010/main" xmlns:ma14="http://schemas.microsoft.com/office/mac/drawingml/2011/main" xmlns="" val="1"/>
             </a:ext>
           </a:extLst>
         </p:spPr>
@@ -13945,7 +13945,7 @@
           </a:ln>
           <a:extLst>
             <a:ext uri="{C572A759-6A51-4108-AA02-DFA0A04FC94B}">
-              <ma14:wrappingTextBoxFlag xmlns="" xmlns:m="http://schemas.openxmlformats.org/officeDocument/2006/math" xmlns:a14="http://schemas.microsoft.com/office/drawing/2010/main" xmlns:ma14="http://schemas.microsoft.com/office/mac/drawingml/2011/main" val="1"/>
+              <ma14:wrappingTextBoxFlag xmlns:ma14="http://schemas.microsoft.com/office/mac/drawingml/2011/main" xmlns:a14="http://schemas.microsoft.com/office/drawing/2010/main" xmlns:m="http://schemas.openxmlformats.org/officeDocument/2006/math" xmlns="" val="1"/>
             </a:ext>
           </a:extLst>
         </p:spPr>
@@ -21889,6 +21889,13 @@
               <a:rPr lang="en-NO" dirty="0"/>
               <a:t>SQL like querying of Kafka topics</a:t>
             </a:r>
+          </a:p>
+          <a:p>
+            <a:r>
+              <a:rPr lang="en-NO"/>
+              <a:t>Kafka Schema Registry</a:t>
+            </a:r>
+            <a:endParaRPr lang="en-NO" dirty="0"/>
           </a:p>
         </p:txBody>
       </p:sp>

</xml_diff>